<commit_message>
up to Label GCN
</commit_message>
<xml_diff>
--- a/figures.pptx
+++ b/figures.pptx
@@ -261,7 +261,7 @@
           <a:p>
             <a:fld id="{14C50D8D-A8BF-4BB2-8C54-3478D41A1FD8}" type="datetimeFigureOut">
               <a:rPr lang="en-US" smtClean="0"/>
-              <a:t>4/25/2023</a:t>
+              <a:t>4/26/2023</a:t>
             </a:fld>
             <a:endParaRPr lang="en-US"/>
           </a:p>
@@ -459,7 +459,7 @@
           <a:p>
             <a:fld id="{14C50D8D-A8BF-4BB2-8C54-3478D41A1FD8}" type="datetimeFigureOut">
               <a:rPr lang="en-US" smtClean="0"/>
-              <a:t>4/25/2023</a:t>
+              <a:t>4/26/2023</a:t>
             </a:fld>
             <a:endParaRPr lang="en-US"/>
           </a:p>
@@ -667,7 +667,7 @@
           <a:p>
             <a:fld id="{14C50D8D-A8BF-4BB2-8C54-3478D41A1FD8}" type="datetimeFigureOut">
               <a:rPr lang="en-US" smtClean="0"/>
-              <a:t>4/25/2023</a:t>
+              <a:t>4/26/2023</a:t>
             </a:fld>
             <a:endParaRPr lang="en-US"/>
           </a:p>
@@ -865,7 +865,7 @@
           <a:p>
             <a:fld id="{14C50D8D-A8BF-4BB2-8C54-3478D41A1FD8}" type="datetimeFigureOut">
               <a:rPr lang="en-US" smtClean="0"/>
-              <a:t>4/25/2023</a:t>
+              <a:t>4/26/2023</a:t>
             </a:fld>
             <a:endParaRPr lang="en-US"/>
           </a:p>
@@ -1140,7 +1140,7 @@
           <a:p>
             <a:fld id="{14C50D8D-A8BF-4BB2-8C54-3478D41A1FD8}" type="datetimeFigureOut">
               <a:rPr lang="en-US" smtClean="0"/>
-              <a:t>4/25/2023</a:t>
+              <a:t>4/26/2023</a:t>
             </a:fld>
             <a:endParaRPr lang="en-US"/>
           </a:p>
@@ -1405,7 +1405,7 @@
           <a:p>
             <a:fld id="{14C50D8D-A8BF-4BB2-8C54-3478D41A1FD8}" type="datetimeFigureOut">
               <a:rPr lang="en-US" smtClean="0"/>
-              <a:t>4/25/2023</a:t>
+              <a:t>4/26/2023</a:t>
             </a:fld>
             <a:endParaRPr lang="en-US"/>
           </a:p>
@@ -1817,7 +1817,7 @@
           <a:p>
             <a:fld id="{14C50D8D-A8BF-4BB2-8C54-3478D41A1FD8}" type="datetimeFigureOut">
               <a:rPr lang="en-US" smtClean="0"/>
-              <a:t>4/25/2023</a:t>
+              <a:t>4/26/2023</a:t>
             </a:fld>
             <a:endParaRPr lang="en-US"/>
           </a:p>
@@ -1958,7 +1958,7 @@
           <a:p>
             <a:fld id="{14C50D8D-A8BF-4BB2-8C54-3478D41A1FD8}" type="datetimeFigureOut">
               <a:rPr lang="en-US" smtClean="0"/>
-              <a:t>4/25/2023</a:t>
+              <a:t>4/26/2023</a:t>
             </a:fld>
             <a:endParaRPr lang="en-US"/>
           </a:p>
@@ -2071,7 +2071,7 @@
           <a:p>
             <a:fld id="{14C50D8D-A8BF-4BB2-8C54-3478D41A1FD8}" type="datetimeFigureOut">
               <a:rPr lang="en-US" smtClean="0"/>
-              <a:t>4/25/2023</a:t>
+              <a:t>4/26/2023</a:t>
             </a:fld>
             <a:endParaRPr lang="en-US"/>
           </a:p>
@@ -2382,7 +2382,7 @@
           <a:p>
             <a:fld id="{14C50D8D-A8BF-4BB2-8C54-3478D41A1FD8}" type="datetimeFigureOut">
               <a:rPr lang="en-US" smtClean="0"/>
-              <a:t>4/25/2023</a:t>
+              <a:t>4/26/2023</a:t>
             </a:fld>
             <a:endParaRPr lang="en-US"/>
           </a:p>
@@ -2670,7 +2670,7 @@
           <a:p>
             <a:fld id="{14C50D8D-A8BF-4BB2-8C54-3478D41A1FD8}" type="datetimeFigureOut">
               <a:rPr lang="en-US" smtClean="0"/>
-              <a:t>4/25/2023</a:t>
+              <a:t>4/26/2023</a:t>
             </a:fld>
             <a:endParaRPr lang="en-US"/>
           </a:p>
@@ -2911,7 +2911,7 @@
           <a:p>
             <a:fld id="{14C50D8D-A8BF-4BB2-8C54-3478D41A1FD8}" type="datetimeFigureOut">
               <a:rPr lang="en-US" smtClean="0"/>
-              <a:t>4/25/2023</a:t>
+              <a:t>4/26/2023</a:t>
             </a:fld>
             <a:endParaRPr lang="en-US"/>
           </a:p>
@@ -6295,8 +6295,8 @@
         </p:nvGrpSpPr>
         <p:grpSpPr>
           <a:xfrm>
-            <a:off x="679268" y="750026"/>
-            <a:ext cx="1955328" cy="4685155"/>
+            <a:off x="2147612" y="1433275"/>
+            <a:ext cx="1750657" cy="4292181"/>
             <a:chOff x="679268" y="750026"/>
             <a:chExt cx="1955328" cy="4685155"/>
           </a:xfrm>
@@ -7205,8 +7205,8 @@
         </p:nvSpPr>
         <p:spPr>
           <a:xfrm>
-            <a:off x="3411308" y="2956010"/>
-            <a:ext cx="1669368" cy="923330"/>
+            <a:off x="4556897" y="3006773"/>
+            <a:ext cx="1606920" cy="923330"/>
           </a:xfrm>
           <a:prstGeom prst="rect">
             <a:avLst/>
@@ -7227,7 +7227,7 @@
           </a:fontRef>
         </p:style>
         <p:txBody>
-          <a:bodyPr wrap="none" rtlCol="0">
+          <a:bodyPr wrap="square" rtlCol="0">
             <a:spAutoFit/>
           </a:bodyPr>
           <a:lstStyle/>
@@ -7268,7 +7268,7 @@
         </p:nvSpPr>
         <p:spPr>
           <a:xfrm>
-            <a:off x="2916144" y="3335755"/>
+            <a:off x="4097862" y="3398927"/>
             <a:ext cx="421461" cy="186489"/>
           </a:xfrm>
           <a:prstGeom prst="rightArrow">
@@ -7300,12 +7300,433 @@
           </a:p>
         </p:txBody>
       </p:sp>
+      <p:sp>
+        <p:nvSpPr>
+          <p:cNvPr id="92" name="Arrow: Right 91">
+            <a:extLst>
+              <a:ext uri="{FF2B5EF4-FFF2-40B4-BE49-F238E27FC236}">
+                <a16:creationId xmlns:a16="http://schemas.microsoft.com/office/drawing/2014/main" id="{FA683EC7-18A6-AF5B-DF30-95078BB05B2B}"/>
+              </a:ext>
+            </a:extLst>
+          </p:cNvPr>
+          <p:cNvSpPr/>
+          <p:nvPr/>
+        </p:nvSpPr>
+        <p:spPr>
+          <a:xfrm>
+            <a:off x="6226557" y="3412582"/>
+            <a:ext cx="421461" cy="186489"/>
+          </a:xfrm>
+          <a:prstGeom prst="rightArrow">
+            <a:avLst/>
+          </a:prstGeom>
+        </p:spPr>
+        <p:style>
+          <a:lnRef idx="2">
+            <a:schemeClr val="accent1">
+              <a:shade val="50000"/>
+            </a:schemeClr>
+          </a:lnRef>
+          <a:fillRef idx="1">
+            <a:schemeClr val="accent1"/>
+          </a:fillRef>
+          <a:effectRef idx="0">
+            <a:schemeClr val="accent1"/>
+          </a:effectRef>
+          <a:fontRef idx="minor">
+            <a:schemeClr val="lt1"/>
+          </a:fontRef>
+        </p:style>
+        <p:txBody>
+          <a:bodyPr rtlCol="0" anchor="ctr"/>
+          <a:lstStyle/>
+          <a:p>
+            <a:pPr algn="ctr"/>
+            <a:endParaRPr lang="en-US"/>
+          </a:p>
+        </p:txBody>
+      </p:sp>
+      <p:sp>
+        <p:nvSpPr>
+          <p:cNvPr id="93" name="TextBox 92">
+            <a:extLst>
+              <a:ext uri="{FF2B5EF4-FFF2-40B4-BE49-F238E27FC236}">
+                <a16:creationId xmlns:a16="http://schemas.microsoft.com/office/drawing/2014/main" id="{BAAE40D1-F3BF-2929-09EE-3887658456D4}"/>
+              </a:ext>
+            </a:extLst>
+          </p:cNvPr>
+          <p:cNvSpPr txBox="1"/>
+          <p:nvPr/>
+        </p:nvSpPr>
+        <p:spPr>
+          <a:xfrm>
+            <a:off x="8884608" y="2885956"/>
+            <a:ext cx="1483013" cy="1200329"/>
+          </a:xfrm>
+          <a:prstGeom prst="rect">
+            <a:avLst/>
+          </a:prstGeom>
+        </p:spPr>
+        <p:style>
+          <a:lnRef idx="1">
+            <a:schemeClr val="accent5"/>
+          </a:lnRef>
+          <a:fillRef idx="2">
+            <a:schemeClr val="accent5"/>
+          </a:fillRef>
+          <a:effectRef idx="1">
+            <a:schemeClr val="accent5"/>
+          </a:effectRef>
+          <a:fontRef idx="minor">
+            <a:schemeClr val="dk1"/>
+          </a:fontRef>
+        </p:style>
+        <p:txBody>
+          <a:bodyPr wrap="square" rtlCol="0">
+            <a:spAutoFit/>
+          </a:bodyPr>
+          <a:lstStyle/>
+          <a:p>
+            <a:pPr algn="ctr"/>
+            <a:r>
+              <a:rPr lang="en-US" dirty="0"/>
+              <a:t>Labeled </a:t>
+            </a:r>
+          </a:p>
+          <a:p>
+            <a:pPr algn="ctr"/>
+            <a:r>
+              <a:rPr lang="en-US" dirty="0"/>
+              <a:t>Graph-Based </a:t>
+            </a:r>
+          </a:p>
+          <a:p>
+            <a:pPr algn="ctr"/>
+            <a:r>
+              <a:rPr lang="en-US" dirty="0"/>
+              <a:t>Convolutional </a:t>
+            </a:r>
+          </a:p>
+          <a:p>
+            <a:pPr algn="ctr"/>
+            <a:r>
+              <a:rPr lang="en-US" dirty="0"/>
+              <a:t>Network</a:t>
+            </a:r>
+          </a:p>
+        </p:txBody>
+      </p:sp>
+      <p:sp>
+        <p:nvSpPr>
+          <p:cNvPr id="94" name="Arrow: Right 93">
+            <a:extLst>
+              <a:ext uri="{FF2B5EF4-FFF2-40B4-BE49-F238E27FC236}">
+                <a16:creationId xmlns:a16="http://schemas.microsoft.com/office/drawing/2014/main" id="{828D3140-80CB-056D-9793-E4009AB55530}"/>
+              </a:ext>
+            </a:extLst>
+          </p:cNvPr>
+          <p:cNvSpPr/>
+          <p:nvPr/>
+        </p:nvSpPr>
+        <p:spPr>
+          <a:xfrm>
+            <a:off x="8447216" y="3392877"/>
+            <a:ext cx="421461" cy="186489"/>
+          </a:xfrm>
+          <a:prstGeom prst="rightArrow">
+            <a:avLst/>
+          </a:prstGeom>
+        </p:spPr>
+        <p:style>
+          <a:lnRef idx="2">
+            <a:schemeClr val="accent1">
+              <a:shade val="50000"/>
+            </a:schemeClr>
+          </a:lnRef>
+          <a:fillRef idx="1">
+            <a:schemeClr val="accent1"/>
+          </a:fillRef>
+          <a:effectRef idx="0">
+            <a:schemeClr val="accent1"/>
+          </a:effectRef>
+          <a:fontRef idx="minor">
+            <a:schemeClr val="lt1"/>
+          </a:fontRef>
+        </p:style>
+        <p:txBody>
+          <a:bodyPr rtlCol="0" anchor="ctr"/>
+          <a:lstStyle/>
+          <a:p>
+            <a:pPr algn="ctr"/>
+            <a:endParaRPr lang="en-US"/>
+          </a:p>
+        </p:txBody>
+      </p:sp>
+      <p:sp>
+        <p:nvSpPr>
+          <p:cNvPr id="95" name="Arrow: Right 94">
+            <a:extLst>
+              <a:ext uri="{FF2B5EF4-FFF2-40B4-BE49-F238E27FC236}">
+                <a16:creationId xmlns:a16="http://schemas.microsoft.com/office/drawing/2014/main" id="{A9415C15-CC7B-B420-E42A-08844CB31634}"/>
+              </a:ext>
+            </a:extLst>
+          </p:cNvPr>
+          <p:cNvSpPr/>
+          <p:nvPr/>
+        </p:nvSpPr>
+        <p:spPr>
+          <a:xfrm>
+            <a:off x="10439613" y="3382828"/>
+            <a:ext cx="421461" cy="186489"/>
+          </a:xfrm>
+          <a:prstGeom prst="rightArrow">
+            <a:avLst/>
+          </a:prstGeom>
+        </p:spPr>
+        <p:style>
+          <a:lnRef idx="2">
+            <a:schemeClr val="accent1">
+              <a:shade val="50000"/>
+            </a:schemeClr>
+          </a:lnRef>
+          <a:fillRef idx="1">
+            <a:schemeClr val="accent1"/>
+          </a:fillRef>
+          <a:effectRef idx="0">
+            <a:schemeClr val="accent1"/>
+          </a:effectRef>
+          <a:fontRef idx="minor">
+            <a:schemeClr val="lt1"/>
+          </a:fontRef>
+        </p:style>
+        <p:txBody>
+          <a:bodyPr rtlCol="0" anchor="ctr"/>
+          <a:lstStyle/>
+          <a:p>
+            <a:pPr algn="ctr"/>
+            <a:endParaRPr lang="en-US"/>
+          </a:p>
+        </p:txBody>
+      </p:sp>
+      <p:sp>
+        <p:nvSpPr>
+          <p:cNvPr id="96" name="Rectangle 95">
+            <a:extLst>
+              <a:ext uri="{FF2B5EF4-FFF2-40B4-BE49-F238E27FC236}">
+                <a16:creationId xmlns:a16="http://schemas.microsoft.com/office/drawing/2014/main" id="{D4675CC3-6277-13C6-6E0F-C41506201477}"/>
+              </a:ext>
+            </a:extLst>
+          </p:cNvPr>
+          <p:cNvSpPr/>
+          <p:nvPr/>
+        </p:nvSpPr>
+        <p:spPr>
+          <a:xfrm>
+            <a:off x="10883160" y="2875909"/>
+            <a:ext cx="132409" cy="1200329"/>
+          </a:xfrm>
+          <a:prstGeom prst="rect">
+            <a:avLst/>
+          </a:prstGeom>
+        </p:spPr>
+        <p:style>
+          <a:lnRef idx="1">
+            <a:schemeClr val="accent5"/>
+          </a:lnRef>
+          <a:fillRef idx="2">
+            <a:schemeClr val="accent5"/>
+          </a:fillRef>
+          <a:effectRef idx="1">
+            <a:schemeClr val="accent5"/>
+          </a:effectRef>
+          <a:fontRef idx="minor">
+            <a:schemeClr val="dk1"/>
+          </a:fontRef>
+        </p:style>
+        <p:txBody>
+          <a:bodyPr rtlCol="0" anchor="ctr"/>
+          <a:lstStyle/>
+          <a:p>
+            <a:pPr algn="ctr"/>
+            <a:endParaRPr lang="en-US"/>
+          </a:p>
+        </p:txBody>
+      </p:sp>
+      <p:sp>
+        <p:nvSpPr>
+          <p:cNvPr id="98" name="TextBox 97">
+            <a:extLst>
+              <a:ext uri="{FF2B5EF4-FFF2-40B4-BE49-F238E27FC236}">
+                <a16:creationId xmlns:a16="http://schemas.microsoft.com/office/drawing/2014/main" id="{B15FAD51-1C27-B241-0F69-23BD5D3FCFD6}"/>
+              </a:ext>
+            </a:extLst>
+          </p:cNvPr>
+          <p:cNvSpPr txBox="1"/>
+          <p:nvPr/>
+        </p:nvSpPr>
+        <p:spPr>
+          <a:xfrm>
+            <a:off x="10159986" y="2414190"/>
+            <a:ext cx="1099602" cy="369332"/>
+          </a:xfrm>
+          <a:prstGeom prst="rect">
+            <a:avLst/>
+          </a:prstGeom>
+          <a:noFill/>
+        </p:spPr>
+        <p:txBody>
+          <a:bodyPr wrap="square">
+            <a:spAutoFit/>
+          </a:bodyPr>
+          <a:lstStyle/>
+          <a:p>
+            <a:pPr algn="ctr"/>
+            <a:r>
+              <a:rPr lang="en-US" dirty="0"/>
+              <a:t>Classifier </a:t>
+            </a:r>
+          </a:p>
+        </p:txBody>
+      </p:sp>
+      <p:sp>
+        <p:nvSpPr>
+          <p:cNvPr id="100" name="TextBox 99">
+            <a:extLst>
+              <a:ext uri="{FF2B5EF4-FFF2-40B4-BE49-F238E27FC236}">
+                <a16:creationId xmlns:a16="http://schemas.microsoft.com/office/drawing/2014/main" id="{B0634F89-D1E3-0999-AE25-529FB0F436BB}"/>
+              </a:ext>
+            </a:extLst>
+          </p:cNvPr>
+          <p:cNvSpPr txBox="1"/>
+          <p:nvPr/>
+        </p:nvSpPr>
+        <p:spPr>
+          <a:xfrm>
+            <a:off x="10439613" y="3096068"/>
+            <a:ext cx="362257" cy="369332"/>
+          </a:xfrm>
+          <a:prstGeom prst="rect">
+            <a:avLst/>
+          </a:prstGeom>
+          <a:noFill/>
+        </p:spPr>
+        <p:txBody>
+          <a:bodyPr wrap="square">
+            <a:spAutoFit/>
+          </a:bodyPr>
+          <a:lstStyle/>
+          <a:p>
+            <a:r>
+              <a:rPr lang="en-US" sz="1800" dirty="0">
+                <a:solidFill>
+                  <a:srgbClr val="7030A0"/>
+                </a:solidFill>
+              </a:rPr>
+              <a:t>V</a:t>
+            </a:r>
+            <a:endParaRPr lang="en-US" dirty="0">
+              <a:solidFill>
+                <a:srgbClr val="7030A0"/>
+              </a:solidFill>
+            </a:endParaRPr>
+          </a:p>
+        </p:txBody>
+      </p:sp>
+      <p:sp>
+        <p:nvSpPr>
+          <p:cNvPr id="101" name="Arrow: Right 100">
+            <a:extLst>
+              <a:ext uri="{FF2B5EF4-FFF2-40B4-BE49-F238E27FC236}">
+                <a16:creationId xmlns:a16="http://schemas.microsoft.com/office/drawing/2014/main" id="{04912007-1CF5-63E2-C5FA-102C461AC781}"/>
+              </a:ext>
+            </a:extLst>
+          </p:cNvPr>
+          <p:cNvSpPr/>
+          <p:nvPr/>
+        </p:nvSpPr>
+        <p:spPr>
+          <a:xfrm>
+            <a:off x="11048857" y="3375194"/>
+            <a:ext cx="421461" cy="186489"/>
+          </a:xfrm>
+          <a:prstGeom prst="rightArrow">
+            <a:avLst/>
+          </a:prstGeom>
+        </p:spPr>
+        <p:style>
+          <a:lnRef idx="2">
+            <a:schemeClr val="accent1">
+              <a:shade val="50000"/>
+            </a:schemeClr>
+          </a:lnRef>
+          <a:fillRef idx="1">
+            <a:schemeClr val="accent1"/>
+          </a:fillRef>
+          <a:effectRef idx="0">
+            <a:schemeClr val="accent1"/>
+          </a:effectRef>
+          <a:fontRef idx="minor">
+            <a:schemeClr val="lt1"/>
+          </a:fontRef>
+        </p:style>
+        <p:txBody>
+          <a:bodyPr rtlCol="0" anchor="ctr"/>
+          <a:lstStyle/>
+          <a:p>
+            <a:pPr algn="ctr"/>
+            <a:endParaRPr lang="en-US"/>
+          </a:p>
+        </p:txBody>
+      </p:sp>
+      <p:sp>
+        <p:nvSpPr>
+          <p:cNvPr id="102" name="TextBox 101">
+            <a:extLst>
+              <a:ext uri="{FF2B5EF4-FFF2-40B4-BE49-F238E27FC236}">
+                <a16:creationId xmlns:a16="http://schemas.microsoft.com/office/drawing/2014/main" id="{CE29F0F7-E0A6-76C7-4296-D79500E32192}"/>
+              </a:ext>
+            </a:extLst>
+          </p:cNvPr>
+          <p:cNvSpPr txBox="1"/>
+          <p:nvPr/>
+        </p:nvSpPr>
+        <p:spPr>
+          <a:xfrm>
+            <a:off x="11259588" y="3059666"/>
+            <a:ext cx="919248" cy="646331"/>
+          </a:xfrm>
+          <a:prstGeom prst="rect">
+            <a:avLst/>
+          </a:prstGeom>
+          <a:noFill/>
+        </p:spPr>
+        <p:txBody>
+          <a:bodyPr wrap="square">
+            <a:spAutoFit/>
+          </a:bodyPr>
+          <a:lstStyle/>
+          <a:p>
+            <a:pPr algn="ctr"/>
+            <a:r>
+              <a:rPr lang="en-US" dirty="0"/>
+              <a:t>Misuse</a:t>
+            </a:r>
+          </a:p>
+          <a:p>
+            <a:pPr algn="ctr"/>
+            <a:r>
+              <a:rPr lang="en-US" dirty="0"/>
+              <a:t>Y/N</a:t>
+            </a:r>
+          </a:p>
+        </p:txBody>
+      </p:sp>
       <p:grpSp>
         <p:nvGrpSpPr>
-          <p:cNvPr id="72" name="Group 71">
-            <a:extLst>
-              <a:ext uri="{FF2B5EF4-FFF2-40B4-BE49-F238E27FC236}">
-                <a16:creationId xmlns:a16="http://schemas.microsoft.com/office/drawing/2014/main" id="{5ED396DF-A8E4-3E0F-A59A-FF1E6D52F438}"/>
+          <p:cNvPr id="2" name="Group 1">
+            <a:extLst>
+              <a:ext uri="{FF2B5EF4-FFF2-40B4-BE49-F238E27FC236}">
+                <a16:creationId xmlns:a16="http://schemas.microsoft.com/office/drawing/2014/main" id="{2AEFB482-B229-6081-01E9-1FB268FB326D}"/>
               </a:ext>
             </a:extLst>
           </p:cNvPr>
@@ -7314,18 +7735,18 @@
         </p:nvGrpSpPr>
         <p:grpSpPr>
           <a:xfrm>
-            <a:off x="5636429" y="842268"/>
-            <a:ext cx="1955328" cy="4685155"/>
+            <a:off x="6500461" y="1359736"/>
+            <a:ext cx="1750657" cy="4292181"/>
             <a:chOff x="679268" y="750026"/>
             <a:chExt cx="1955328" cy="4685155"/>
           </a:xfrm>
         </p:grpSpPr>
         <p:sp>
           <p:nvSpPr>
-            <p:cNvPr id="73" name="Rectangle 72">
+            <p:cNvPr id="3" name="Rectangle 2">
               <a:extLst>
                 <a:ext uri="{FF2B5EF4-FFF2-40B4-BE49-F238E27FC236}">
-                  <a16:creationId xmlns:a16="http://schemas.microsoft.com/office/drawing/2014/main" id="{160FF9CF-2FBF-8299-6456-B23A21453788}"/>
+                  <a16:creationId xmlns:a16="http://schemas.microsoft.com/office/drawing/2014/main" id="{922A7AE5-D7C5-7091-AC61-6640565A3CA2}"/>
                 </a:ext>
               </a:extLst>
             </p:cNvPr>
@@ -7376,10 +7797,10 @@
         </p:sp>
         <p:sp>
           <p:nvSpPr>
-            <p:cNvPr id="74" name="Oval 73">
+            <p:cNvPr id="4" name="Oval 3">
               <a:extLst>
                 <a:ext uri="{FF2B5EF4-FFF2-40B4-BE49-F238E27FC236}">
-                  <a16:creationId xmlns:a16="http://schemas.microsoft.com/office/drawing/2014/main" id="{59E46ED9-F08A-70CB-0D01-037026CDBC0A}"/>
+                  <a16:creationId xmlns:a16="http://schemas.microsoft.com/office/drawing/2014/main" id="{C98B6BB6-3E7C-FE4B-1780-363DF5815BA7}"/>
                 </a:ext>
               </a:extLst>
             </p:cNvPr>
@@ -7430,17 +7851,17 @@
         </p:sp>
         <p:cxnSp>
           <p:nvCxnSpPr>
-            <p:cNvPr id="75" name="Straight Arrow Connector 74">
+            <p:cNvPr id="11" name="Straight Arrow Connector 10">
               <a:extLst>
                 <a:ext uri="{FF2B5EF4-FFF2-40B4-BE49-F238E27FC236}">
-                  <a16:creationId xmlns:a16="http://schemas.microsoft.com/office/drawing/2014/main" id="{28105535-A702-98E0-1A36-A2BB7FD4E5B1}"/>
+                  <a16:creationId xmlns:a16="http://schemas.microsoft.com/office/drawing/2014/main" id="{3C466711-F4F7-224D-E8A4-71D875D8A1D6}"/>
                 </a:ext>
               </a:extLst>
             </p:cNvPr>
             <p:cNvCxnSpPr>
               <a:cxnSpLocks/>
-              <a:stCxn id="74" idx="4"/>
-              <a:endCxn id="73" idx="0"/>
+              <a:stCxn id="4" idx="4"/>
+              <a:endCxn id="3" idx="0"/>
             </p:cNvCxnSpPr>
             <p:nvPr/>
           </p:nvCxnSpPr>
@@ -7473,10 +7894,10 @@
         </p:cxnSp>
         <p:sp>
           <p:nvSpPr>
-            <p:cNvPr id="76" name="Rectangle 75">
+            <p:cNvPr id="14" name="Rectangle 13">
               <a:extLst>
                 <a:ext uri="{FF2B5EF4-FFF2-40B4-BE49-F238E27FC236}">
-                  <a16:creationId xmlns:a16="http://schemas.microsoft.com/office/drawing/2014/main" id="{B32A8E71-9C01-54C5-C3F3-01E60AC14E40}"/>
+                  <a16:creationId xmlns:a16="http://schemas.microsoft.com/office/drawing/2014/main" id="{38CB205B-57EF-766B-F5CC-9B2206F11617}"/>
                 </a:ext>
               </a:extLst>
             </p:cNvPr>
@@ -7527,10 +7948,10 @@
         </p:sp>
         <p:sp>
           <p:nvSpPr>
-            <p:cNvPr id="77" name="Oval 76">
+            <p:cNvPr id="18" name="Oval 17">
               <a:extLst>
                 <a:ext uri="{FF2B5EF4-FFF2-40B4-BE49-F238E27FC236}">
-                  <a16:creationId xmlns:a16="http://schemas.microsoft.com/office/drawing/2014/main" id="{5B253191-21BD-EF8B-D506-F3A2EC1CCD3D}"/>
+                  <a16:creationId xmlns:a16="http://schemas.microsoft.com/office/drawing/2014/main" id="{2DDE7224-943E-40ED-FBB3-9A45349FCEE4}"/>
                 </a:ext>
               </a:extLst>
             </p:cNvPr>
@@ -7581,16 +8002,16 @@
         </p:sp>
         <p:cxnSp>
           <p:nvCxnSpPr>
-            <p:cNvPr id="78" name="Straight Arrow Connector 77">
+            <p:cNvPr id="23" name="Straight Arrow Connector 22">
               <a:extLst>
                 <a:ext uri="{FF2B5EF4-FFF2-40B4-BE49-F238E27FC236}">
-                  <a16:creationId xmlns:a16="http://schemas.microsoft.com/office/drawing/2014/main" id="{E9E6421B-387E-162E-7541-FD89E7DACE87}"/>
+                  <a16:creationId xmlns:a16="http://schemas.microsoft.com/office/drawing/2014/main" id="{BD434B60-653F-2BF9-2EDA-055600C04750}"/>
                 </a:ext>
               </a:extLst>
             </p:cNvPr>
             <p:cNvCxnSpPr>
-              <a:stCxn id="73" idx="2"/>
-              <a:endCxn id="77" idx="0"/>
+              <a:stCxn id="3" idx="2"/>
+              <a:endCxn id="18" idx="0"/>
             </p:cNvCxnSpPr>
             <p:nvPr/>
           </p:nvCxnSpPr>
@@ -7623,10 +8044,10 @@
         </p:cxnSp>
         <p:sp>
           <p:nvSpPr>
-            <p:cNvPr id="79" name="Rectangle 78">
+            <p:cNvPr id="25" name="Rectangle 24">
               <a:extLst>
                 <a:ext uri="{FF2B5EF4-FFF2-40B4-BE49-F238E27FC236}">
-                  <a16:creationId xmlns:a16="http://schemas.microsoft.com/office/drawing/2014/main" id="{1F102481-5B3A-3915-FB31-3D5A51B14D43}"/>
+                  <a16:creationId xmlns:a16="http://schemas.microsoft.com/office/drawing/2014/main" id="{92C76701-29C2-3059-3441-EA3DE0AE9A30}"/>
                 </a:ext>
               </a:extLst>
             </p:cNvPr>
@@ -7636,7 +8057,7 @@
           <p:spPr>
             <a:xfrm>
               <a:off x="880219" y="3431603"/>
-              <a:ext cx="1553426" cy="321137"/>
+              <a:ext cx="1553425" cy="321137"/>
             </a:xfrm>
             <a:prstGeom prst="rect">
               <a:avLst/>
@@ -7677,16 +8098,16 @@
         </p:sp>
         <p:cxnSp>
           <p:nvCxnSpPr>
-            <p:cNvPr id="80" name="Straight Arrow Connector 79">
+            <p:cNvPr id="26" name="Straight Arrow Connector 25">
               <a:extLst>
                 <a:ext uri="{FF2B5EF4-FFF2-40B4-BE49-F238E27FC236}">
-                  <a16:creationId xmlns:a16="http://schemas.microsoft.com/office/drawing/2014/main" id="{A596C475-9749-6F3B-10CF-55ACC6292642}"/>
+                  <a16:creationId xmlns:a16="http://schemas.microsoft.com/office/drawing/2014/main" id="{56B5D352-2325-E5A0-F0B3-0BD0BD54A90F}"/>
                 </a:ext>
               </a:extLst>
             </p:cNvPr>
             <p:cNvCxnSpPr>
-              <a:stCxn id="77" idx="4"/>
-              <a:endCxn id="79" idx="0"/>
+              <a:stCxn id="18" idx="4"/>
+              <a:endCxn id="25" idx="0"/>
             </p:cNvCxnSpPr>
             <p:nvPr/>
           </p:nvCxnSpPr>
@@ -7719,10 +8140,10 @@
         </p:cxnSp>
         <p:grpSp>
           <p:nvGrpSpPr>
-            <p:cNvPr id="81" name="Group 80">
+            <p:cNvPr id="29" name="Group 28">
               <a:extLst>
                 <a:ext uri="{FF2B5EF4-FFF2-40B4-BE49-F238E27FC236}">
-                  <a16:creationId xmlns:a16="http://schemas.microsoft.com/office/drawing/2014/main" id="{2A40A7EE-71A9-0CFF-C76A-7465AB3562F9}"/>
+                  <a16:creationId xmlns:a16="http://schemas.microsoft.com/office/drawing/2014/main" id="{02218413-CC9F-527E-6CD5-BA4765CEB008}"/>
                 </a:ext>
               </a:extLst>
             </p:cNvPr>
@@ -7732,17 +8153,17 @@
           <p:grpSpPr>
             <a:xfrm>
               <a:off x="1409819" y="3926435"/>
-              <a:ext cx="684524" cy="464795"/>
+              <a:ext cx="684524" cy="507063"/>
               <a:chOff x="9415878" y="3160675"/>
-              <a:chExt cx="769272" cy="685557"/>
+              <a:chExt cx="769272" cy="747901"/>
             </a:xfrm>
           </p:grpSpPr>
           <p:sp>
             <p:nvSpPr>
-              <p:cNvPr id="90" name="Rectangle 89">
+              <p:cNvPr id="39" name="Rectangle 38">
                 <a:extLst>
                   <a:ext uri="{FF2B5EF4-FFF2-40B4-BE49-F238E27FC236}">
-                    <a16:creationId xmlns:a16="http://schemas.microsoft.com/office/drawing/2014/main" id="{8585B30D-DCEA-4888-8501-F647C3632794}"/>
+                    <a16:creationId xmlns:a16="http://schemas.microsoft.com/office/drawing/2014/main" id="{04E7E6E2-C52E-9B2E-17DF-83A15E6111AA}"/>
                   </a:ext>
                 </a:extLst>
               </p:cNvPr>
@@ -7786,10 +8207,10 @@
           </p:sp>
           <p:sp>
             <p:nvSpPr>
-              <p:cNvPr id="91" name="TextBox 90">
+              <p:cNvPr id="40" name="TextBox 39">
                 <a:extLst>
                   <a:ext uri="{FF2B5EF4-FFF2-40B4-BE49-F238E27FC236}">
-                    <a16:creationId xmlns:a16="http://schemas.microsoft.com/office/drawing/2014/main" id="{CC9ED1F3-7905-468A-A02A-B8D895D62F4B}"/>
+                    <a16:creationId xmlns:a16="http://schemas.microsoft.com/office/drawing/2014/main" id="{CAB6E95F-43EB-EB2A-2E7F-BBF17C55367E}"/>
                   </a:ext>
                 </a:extLst>
               </p:cNvPr>
@@ -7799,7 +8220,7 @@
             <p:spPr>
               <a:xfrm>
                 <a:off x="9432517" y="3165292"/>
-                <a:ext cx="752633" cy="680940"/>
+                <a:ext cx="752633" cy="743284"/>
               </a:xfrm>
               <a:prstGeom prst="rect">
                 <a:avLst/>
@@ -7826,23 +8247,23 @@
         </p:grpSp>
         <p:cxnSp>
           <p:nvCxnSpPr>
-            <p:cNvPr id="82" name="Straight Arrow Connector 81">
+            <p:cNvPr id="30" name="Straight Arrow Connector 29">
               <a:extLst>
                 <a:ext uri="{FF2B5EF4-FFF2-40B4-BE49-F238E27FC236}">
-                  <a16:creationId xmlns:a16="http://schemas.microsoft.com/office/drawing/2014/main" id="{682BAA98-5A3D-D143-5AE2-180D881D4760}"/>
+                  <a16:creationId xmlns:a16="http://schemas.microsoft.com/office/drawing/2014/main" id="{87A3F218-E615-755F-A465-1820B3B0D7D8}"/>
                 </a:ext>
               </a:extLst>
             </p:cNvPr>
             <p:cNvCxnSpPr>
               <a:cxnSpLocks/>
-              <a:stCxn id="79" idx="2"/>
+              <a:stCxn id="25" idx="2"/>
             </p:cNvCxnSpPr>
             <p:nvPr/>
           </p:nvCxnSpPr>
           <p:spPr>
             <a:xfrm flipH="1">
               <a:off x="1644107" y="3752740"/>
-              <a:ext cx="12825" cy="253200"/>
+              <a:ext cx="12825" cy="253199"/>
             </a:xfrm>
             <a:prstGeom prst="straightConnector1">
               <a:avLst/>
@@ -7868,16 +8289,16 @@
         </p:cxnSp>
         <p:cxnSp>
           <p:nvCxnSpPr>
-            <p:cNvPr id="83" name="Connector: Elbow 82">
+            <p:cNvPr id="31" name="Connector: Elbow 30">
               <a:extLst>
                 <a:ext uri="{FF2B5EF4-FFF2-40B4-BE49-F238E27FC236}">
-                  <a16:creationId xmlns:a16="http://schemas.microsoft.com/office/drawing/2014/main" id="{0692C21C-2B91-71BF-B1D5-586E8A239749}"/>
+                  <a16:creationId xmlns:a16="http://schemas.microsoft.com/office/drawing/2014/main" id="{53CB9F38-B0B4-8275-89E6-5FB988EFD6DC}"/>
                 </a:ext>
               </a:extLst>
             </p:cNvPr>
             <p:cNvCxnSpPr>
-              <a:stCxn id="73" idx="3"/>
-              <a:endCxn id="79" idx="3"/>
+              <a:stCxn id="3" idx="3"/>
+              <a:endCxn id="25" idx="3"/>
             </p:cNvCxnSpPr>
             <p:nvPr/>
           </p:nvCxnSpPr>
@@ -7913,10 +8334,10 @@
         </p:cxnSp>
         <p:sp>
           <p:nvSpPr>
-            <p:cNvPr id="84" name="Rectangle 83">
+            <p:cNvPr id="33" name="Rectangle 32">
               <a:extLst>
                 <a:ext uri="{FF2B5EF4-FFF2-40B4-BE49-F238E27FC236}">
-                  <a16:creationId xmlns:a16="http://schemas.microsoft.com/office/drawing/2014/main" id="{989CB7EE-E401-2DC6-B818-58CCF3156F00}"/>
+                  <a16:creationId xmlns:a16="http://schemas.microsoft.com/office/drawing/2014/main" id="{05C3E7E9-8317-079C-FCDE-5BB625E8FE97}"/>
                 </a:ext>
               </a:extLst>
             </p:cNvPr>
@@ -7967,16 +8388,16 @@
         </p:sp>
         <p:cxnSp>
           <p:nvCxnSpPr>
-            <p:cNvPr id="85" name="Straight Arrow Connector 84">
+            <p:cNvPr id="34" name="Straight Arrow Connector 33">
               <a:extLst>
                 <a:ext uri="{FF2B5EF4-FFF2-40B4-BE49-F238E27FC236}">
-                  <a16:creationId xmlns:a16="http://schemas.microsoft.com/office/drawing/2014/main" id="{D1A983B0-AD79-82B0-1FB1-52D0BBDB794A}"/>
+                  <a16:creationId xmlns:a16="http://schemas.microsoft.com/office/drawing/2014/main" id="{C1EBF782-97ED-F4CB-C934-E334B49C73A3}"/>
                 </a:ext>
               </a:extLst>
             </p:cNvPr>
             <p:cNvCxnSpPr>
               <a:cxnSpLocks/>
-              <a:endCxn id="84" idx="0"/>
+              <a:endCxn id="33" idx="0"/>
             </p:cNvCxnSpPr>
             <p:nvPr/>
           </p:nvCxnSpPr>
@@ -8010,10 +8431,10 @@
         </p:cxnSp>
         <p:sp>
           <p:nvSpPr>
-            <p:cNvPr id="86" name="Rectangle 85">
+            <p:cNvPr id="35" name="Rectangle 34">
               <a:extLst>
                 <a:ext uri="{FF2B5EF4-FFF2-40B4-BE49-F238E27FC236}">
-                  <a16:creationId xmlns:a16="http://schemas.microsoft.com/office/drawing/2014/main" id="{1184010F-305A-6DF6-8006-A691CBB81715}"/>
+                  <a16:creationId xmlns:a16="http://schemas.microsoft.com/office/drawing/2014/main" id="{236EA60B-E630-0197-5EDD-1A2F36F3E4F2}"/>
                 </a:ext>
               </a:extLst>
             </p:cNvPr>
@@ -8052,29 +8473,34 @@
             <a:p>
               <a:pPr algn="ctr"/>
               <a:r>
-                <a:rPr lang="en-US" sz="2400" dirty="0">
+                <a:rPr lang="en-US" sz="2400">
                   <a:solidFill>
                     <a:srgbClr val="00B050"/>
                   </a:solidFill>
                 </a:rPr>
                 <a:t>V7</a:t>
               </a:r>
+              <a:endParaRPr lang="en-US" sz="2400" dirty="0">
+                <a:solidFill>
+                  <a:srgbClr val="00B050"/>
+                </a:solidFill>
+              </a:endParaRPr>
             </a:p>
           </p:txBody>
         </p:sp>
         <p:cxnSp>
           <p:nvCxnSpPr>
-            <p:cNvPr id="87" name="Straight Arrow Connector 86">
+            <p:cNvPr id="36" name="Straight Arrow Connector 35">
               <a:extLst>
                 <a:ext uri="{FF2B5EF4-FFF2-40B4-BE49-F238E27FC236}">
-                  <a16:creationId xmlns:a16="http://schemas.microsoft.com/office/drawing/2014/main" id="{D3B208E2-5AE0-8407-E57E-21D30FA09B26}"/>
+                  <a16:creationId xmlns:a16="http://schemas.microsoft.com/office/drawing/2014/main" id="{EE24F1DB-7A3F-AB65-ADAC-835D0458A288}"/>
                 </a:ext>
               </a:extLst>
             </p:cNvPr>
             <p:cNvCxnSpPr>
               <a:cxnSpLocks/>
-              <a:stCxn id="84" idx="2"/>
-              <a:endCxn id="86" idx="0"/>
+              <a:stCxn id="33" idx="2"/>
+              <a:endCxn id="35" idx="0"/>
             </p:cNvCxnSpPr>
             <p:nvPr/>
           </p:nvCxnSpPr>
@@ -8108,28 +8534,28 @@
         </p:cxnSp>
         <p:cxnSp>
           <p:nvCxnSpPr>
-            <p:cNvPr id="88" name="Connector: Elbow 87">
+            <p:cNvPr id="37" name="Connector: Elbow 36">
               <a:extLst>
                 <a:ext uri="{FF2B5EF4-FFF2-40B4-BE49-F238E27FC236}">
-                  <a16:creationId xmlns:a16="http://schemas.microsoft.com/office/drawing/2014/main" id="{ED9403B9-CEF7-5CE1-56CF-2B82C0EFB8AA}"/>
+                  <a16:creationId xmlns:a16="http://schemas.microsoft.com/office/drawing/2014/main" id="{212A1F11-9C86-A2BE-9629-CAE7C46C33C0}"/>
                 </a:ext>
               </a:extLst>
             </p:cNvPr>
             <p:cNvCxnSpPr>
               <a:cxnSpLocks/>
-              <a:stCxn id="91" idx="3"/>
-              <a:endCxn id="86" idx="3"/>
+              <a:stCxn id="40" idx="3"/>
+              <a:endCxn id="35" idx="3"/>
             </p:cNvCxnSpPr>
             <p:nvPr/>
           </p:nvCxnSpPr>
           <p:spPr>
             <a:xfrm>
-              <a:off x="2094343" y="4160398"/>
-              <a:ext cx="476910" cy="1114215"/>
+              <a:off x="2094343" y="4181531"/>
+              <a:ext cx="476910" cy="1093082"/>
             </a:xfrm>
             <a:prstGeom prst="bentConnector3">
               <a:avLst>
-                <a:gd name="adj1" fmla="val 147934"/>
+                <a:gd name="adj1" fmla="val 153538"/>
               </a:avLst>
             </a:prstGeom>
             <a:ln>
@@ -8154,10 +8580,10 @@
         </p:cxnSp>
         <p:sp>
           <p:nvSpPr>
-            <p:cNvPr id="89" name="Rectangle 88">
+            <p:cNvPr id="38" name="Rectangle 37">
               <a:extLst>
                 <a:ext uri="{FF2B5EF4-FFF2-40B4-BE49-F238E27FC236}">
-                  <a16:creationId xmlns:a16="http://schemas.microsoft.com/office/drawing/2014/main" id="{514038D9-3290-A444-2F4E-AA3A12380609}"/>
+                  <a16:creationId xmlns:a16="http://schemas.microsoft.com/office/drawing/2014/main" id="{B4AC579B-8323-A273-C457-F0888E8A5D2E}"/>
                 </a:ext>
               </a:extLst>
             </p:cNvPr>
@@ -8212,10 +8638,59 @@
       </p:grpSp>
       <p:sp>
         <p:nvSpPr>
-          <p:cNvPr id="92" name="Arrow: Right 91">
-            <a:extLst>
-              <a:ext uri="{FF2B5EF4-FFF2-40B4-BE49-F238E27FC236}">
-                <a16:creationId xmlns:a16="http://schemas.microsoft.com/office/drawing/2014/main" id="{FA683EC7-18A6-AF5B-DF30-95078BB05B2B}"/>
+          <p:cNvPr id="41" name="TextBox 40">
+            <a:extLst>
+              <a:ext uri="{FF2B5EF4-FFF2-40B4-BE49-F238E27FC236}">
+                <a16:creationId xmlns:a16="http://schemas.microsoft.com/office/drawing/2014/main" id="{8912CB3B-D21B-1167-5BD0-E03B9F7655C8}"/>
+              </a:ext>
+            </a:extLst>
+          </p:cNvPr>
+          <p:cNvSpPr txBox="1"/>
+          <p:nvPr/>
+        </p:nvSpPr>
+        <p:spPr>
+          <a:xfrm>
+            <a:off x="913666" y="3044161"/>
+            <a:ext cx="846885" cy="923330"/>
+          </a:xfrm>
+          <a:prstGeom prst="rect">
+            <a:avLst/>
+          </a:prstGeom>
+        </p:spPr>
+        <p:style>
+          <a:lnRef idx="1">
+            <a:schemeClr val="accent5"/>
+          </a:lnRef>
+          <a:fillRef idx="2">
+            <a:schemeClr val="accent5"/>
+          </a:fillRef>
+          <a:effectRef idx="1">
+            <a:schemeClr val="accent5"/>
+          </a:effectRef>
+          <a:fontRef idx="minor">
+            <a:schemeClr val="dk1"/>
+          </a:fontRef>
+        </p:style>
+        <p:txBody>
+          <a:bodyPr wrap="square" rtlCol="0">
+            <a:spAutoFit/>
+          </a:bodyPr>
+          <a:lstStyle/>
+          <a:p>
+            <a:pPr algn="ctr"/>
+            <a:r>
+              <a:rPr lang="en-US" dirty="0"/>
+              <a:t>Usage graph builder</a:t>
+            </a:r>
+          </a:p>
+        </p:txBody>
+      </p:sp>
+      <p:sp>
+        <p:nvSpPr>
+          <p:cNvPr id="42" name="Arrow: Right 41">
+            <a:extLst>
+              <a:ext uri="{FF2B5EF4-FFF2-40B4-BE49-F238E27FC236}">
+                <a16:creationId xmlns:a16="http://schemas.microsoft.com/office/drawing/2014/main" id="{0C9BE5D5-C174-8B22-B5BE-6E55AD7C8DC6}"/>
               </a:ext>
             </a:extLst>
           </p:cNvPr>
@@ -8224,7 +8699,7 @@
         </p:nvSpPr>
         <p:spPr>
           <a:xfrm>
-            <a:off x="5154379" y="3335754"/>
+            <a:off x="1851528" y="3372156"/>
             <a:ext cx="421461" cy="186489"/>
           </a:xfrm>
           <a:prstGeom prst="rightArrow">
@@ -8258,10 +8733,10 @@
       </p:sp>
       <p:sp>
         <p:nvSpPr>
-          <p:cNvPr id="93" name="TextBox 92">
-            <a:extLst>
-              <a:ext uri="{FF2B5EF4-FFF2-40B4-BE49-F238E27FC236}">
-                <a16:creationId xmlns:a16="http://schemas.microsoft.com/office/drawing/2014/main" id="{BAAE40D1-F3BF-2929-09EE-3887658456D4}"/>
+          <p:cNvPr id="43" name="TextBox 42">
+            <a:extLst>
+              <a:ext uri="{FF2B5EF4-FFF2-40B4-BE49-F238E27FC236}">
+                <a16:creationId xmlns:a16="http://schemas.microsoft.com/office/drawing/2014/main" id="{CAB4FD2B-6824-5754-AA89-FE2ECE0BC8FF}"/>
               </a:ext>
             </a:extLst>
           </p:cNvPr>
@@ -8270,214 +8745,8 @@
         </p:nvSpPr>
         <p:spPr>
           <a:xfrm>
-            <a:off x="8370260" y="2817510"/>
-            <a:ext cx="1551960" cy="1200329"/>
-          </a:xfrm>
-          <a:prstGeom prst="rect">
-            <a:avLst/>
-          </a:prstGeom>
-        </p:spPr>
-        <p:style>
-          <a:lnRef idx="1">
-            <a:schemeClr val="accent5"/>
-          </a:lnRef>
-          <a:fillRef idx="2">
-            <a:schemeClr val="accent5"/>
-          </a:fillRef>
-          <a:effectRef idx="1">
-            <a:schemeClr val="accent5"/>
-          </a:effectRef>
-          <a:fontRef idx="minor">
-            <a:schemeClr val="dk1"/>
-          </a:fontRef>
-        </p:style>
-        <p:txBody>
-          <a:bodyPr wrap="square" rtlCol="0">
-            <a:spAutoFit/>
-          </a:bodyPr>
-          <a:lstStyle/>
-          <a:p>
-            <a:pPr algn="ctr"/>
-            <a:r>
-              <a:rPr lang="en-US" dirty="0"/>
-              <a:t>Labeled </a:t>
-            </a:r>
-          </a:p>
-          <a:p>
-            <a:pPr algn="ctr"/>
-            <a:r>
-              <a:rPr lang="en-US" dirty="0"/>
-              <a:t>Graph-Based </a:t>
-            </a:r>
-          </a:p>
-          <a:p>
-            <a:pPr algn="ctr"/>
-            <a:r>
-              <a:rPr lang="en-US" dirty="0"/>
-              <a:t>Convolutional </a:t>
-            </a:r>
-          </a:p>
-          <a:p>
-            <a:pPr algn="ctr"/>
-            <a:r>
-              <a:rPr lang="en-US" dirty="0"/>
-              <a:t>Network</a:t>
-            </a:r>
-          </a:p>
-        </p:txBody>
-      </p:sp>
-      <p:sp>
-        <p:nvSpPr>
-          <p:cNvPr id="94" name="Arrow: Right 93">
-            <a:extLst>
-              <a:ext uri="{FF2B5EF4-FFF2-40B4-BE49-F238E27FC236}">
-                <a16:creationId xmlns:a16="http://schemas.microsoft.com/office/drawing/2014/main" id="{828D3140-80CB-056D-9793-E4009AB55530}"/>
-              </a:ext>
-            </a:extLst>
-          </p:cNvPr>
-          <p:cNvSpPr/>
-          <p:nvPr/>
-        </p:nvSpPr>
-        <p:spPr>
-          <a:xfrm>
-            <a:off x="7858561" y="3338504"/>
-            <a:ext cx="421461" cy="186489"/>
-          </a:xfrm>
-          <a:prstGeom prst="rightArrow">
-            <a:avLst/>
-          </a:prstGeom>
-        </p:spPr>
-        <p:style>
-          <a:lnRef idx="2">
-            <a:schemeClr val="accent1">
-              <a:shade val="50000"/>
-            </a:schemeClr>
-          </a:lnRef>
-          <a:fillRef idx="1">
-            <a:schemeClr val="accent1"/>
-          </a:fillRef>
-          <a:effectRef idx="0">
-            <a:schemeClr val="accent1"/>
-          </a:effectRef>
-          <a:fontRef idx="minor">
-            <a:schemeClr val="lt1"/>
-          </a:fontRef>
-        </p:style>
-        <p:txBody>
-          <a:bodyPr rtlCol="0" anchor="ctr"/>
-          <a:lstStyle/>
-          <a:p>
-            <a:pPr algn="ctr"/>
-            <a:endParaRPr lang="en-US"/>
-          </a:p>
-        </p:txBody>
-      </p:sp>
-      <p:sp>
-        <p:nvSpPr>
-          <p:cNvPr id="95" name="Arrow: Right 94">
-            <a:extLst>
-              <a:ext uri="{FF2B5EF4-FFF2-40B4-BE49-F238E27FC236}">
-                <a16:creationId xmlns:a16="http://schemas.microsoft.com/office/drawing/2014/main" id="{A9415C15-CC7B-B420-E42A-08844CB31634}"/>
-              </a:ext>
-            </a:extLst>
-          </p:cNvPr>
-          <p:cNvSpPr/>
-          <p:nvPr/>
-        </p:nvSpPr>
-        <p:spPr>
-          <a:xfrm>
-            <a:off x="10002188" y="3352536"/>
-            <a:ext cx="421461" cy="186489"/>
-          </a:xfrm>
-          <a:prstGeom prst="rightArrow">
-            <a:avLst/>
-          </a:prstGeom>
-        </p:spPr>
-        <p:style>
-          <a:lnRef idx="2">
-            <a:schemeClr val="accent1">
-              <a:shade val="50000"/>
-            </a:schemeClr>
-          </a:lnRef>
-          <a:fillRef idx="1">
-            <a:schemeClr val="accent1"/>
-          </a:fillRef>
-          <a:effectRef idx="0">
-            <a:schemeClr val="accent1"/>
-          </a:effectRef>
-          <a:fontRef idx="minor">
-            <a:schemeClr val="lt1"/>
-          </a:fontRef>
-        </p:style>
-        <p:txBody>
-          <a:bodyPr rtlCol="0" anchor="ctr"/>
-          <a:lstStyle/>
-          <a:p>
-            <a:pPr algn="ctr"/>
-            <a:endParaRPr lang="en-US"/>
-          </a:p>
-        </p:txBody>
-      </p:sp>
-      <p:sp>
-        <p:nvSpPr>
-          <p:cNvPr id="96" name="Rectangle 95">
-            <a:extLst>
-              <a:ext uri="{FF2B5EF4-FFF2-40B4-BE49-F238E27FC236}">
-                <a16:creationId xmlns:a16="http://schemas.microsoft.com/office/drawing/2014/main" id="{D4675CC3-6277-13C6-6E0F-C41506201477}"/>
-              </a:ext>
-            </a:extLst>
-          </p:cNvPr>
-          <p:cNvSpPr/>
-          <p:nvPr/>
-        </p:nvSpPr>
-        <p:spPr>
-          <a:xfrm>
-            <a:off x="10536811" y="2817510"/>
-            <a:ext cx="249696" cy="1200329"/>
-          </a:xfrm>
-          <a:prstGeom prst="rect">
-            <a:avLst/>
-          </a:prstGeom>
-        </p:spPr>
-        <p:style>
-          <a:lnRef idx="1">
-            <a:schemeClr val="accent5"/>
-          </a:lnRef>
-          <a:fillRef idx="2">
-            <a:schemeClr val="accent5"/>
-          </a:fillRef>
-          <a:effectRef idx="1">
-            <a:schemeClr val="accent5"/>
-          </a:effectRef>
-          <a:fontRef idx="minor">
-            <a:schemeClr val="dk1"/>
-          </a:fontRef>
-        </p:style>
-        <p:txBody>
-          <a:bodyPr rtlCol="0" anchor="ctr"/>
-          <a:lstStyle/>
-          <a:p>
-            <a:pPr algn="ctr"/>
-            <a:endParaRPr lang="en-US"/>
-          </a:p>
-        </p:txBody>
-      </p:sp>
-      <p:sp>
-        <p:nvSpPr>
-          <p:cNvPr id="98" name="TextBox 97">
-            <a:extLst>
-              <a:ext uri="{FF2B5EF4-FFF2-40B4-BE49-F238E27FC236}">
-                <a16:creationId xmlns:a16="http://schemas.microsoft.com/office/drawing/2014/main" id="{B15FAD51-1C27-B241-0F69-23BD5D3FCFD6}"/>
-              </a:ext>
-            </a:extLst>
-          </p:cNvPr>
-          <p:cNvSpPr txBox="1"/>
-          <p:nvPr/>
-        </p:nvSpPr>
-        <p:spPr>
-          <a:xfrm>
-            <a:off x="10111858" y="2414190"/>
-            <a:ext cx="1099602" cy="369332"/>
+            <a:off x="-192912" y="3152909"/>
+            <a:ext cx="1036539" cy="646331"/>
           </a:xfrm>
           <a:prstGeom prst="rect">
             <a:avLst/>
@@ -8493,140 +8762,60 @@
             <a:pPr algn="ctr"/>
             <a:r>
               <a:rPr lang="en-US" dirty="0"/>
-              <a:t>Classifier </a:t>
-            </a:r>
-          </a:p>
-        </p:txBody>
-      </p:sp>
-      <p:sp>
-        <p:nvSpPr>
-          <p:cNvPr id="100" name="TextBox 99">
-            <a:extLst>
-              <a:ext uri="{FF2B5EF4-FFF2-40B4-BE49-F238E27FC236}">
-                <a16:creationId xmlns:a16="http://schemas.microsoft.com/office/drawing/2014/main" id="{B0634F89-D1E3-0999-AE25-529FB0F436BB}"/>
-              </a:ext>
-            </a:extLst>
-          </p:cNvPr>
-          <p:cNvSpPr txBox="1"/>
+              <a:t>Source</a:t>
+            </a:r>
+          </a:p>
+          <a:p>
+            <a:pPr algn="ctr"/>
+            <a:r>
+              <a:rPr lang="en-US" dirty="0"/>
+              <a:t>Code</a:t>
+            </a:r>
+          </a:p>
+        </p:txBody>
+      </p:sp>
+      <p:cxnSp>
+        <p:nvCxnSpPr>
+          <p:cNvPr id="49" name="Straight Arrow Connector 48">
+            <a:extLst>
+              <a:ext uri="{FF2B5EF4-FFF2-40B4-BE49-F238E27FC236}">
+                <a16:creationId xmlns:a16="http://schemas.microsoft.com/office/drawing/2014/main" id="{2F7AAC56-D8D0-1A99-2317-3544E21EBC4B}"/>
+              </a:ext>
+            </a:extLst>
+          </p:cNvPr>
+          <p:cNvCxnSpPr>
+            <a:cxnSpLocks/>
+            <a:endCxn id="41" idx="1"/>
+          </p:cNvCxnSpPr>
           <p:nvPr/>
-        </p:nvSpPr>
+        </p:nvCxnSpPr>
         <p:spPr>
           <a:xfrm>
-            <a:off x="10002188" y="3059666"/>
-            <a:ext cx="421461" cy="369332"/>
+            <a:off x="529389" y="3505826"/>
+            <a:ext cx="384277" cy="0"/>
           </a:xfrm>
-          <a:prstGeom prst="rect">
+          <a:prstGeom prst="straightConnector1">
             <a:avLst/>
           </a:prstGeom>
-          <a:noFill/>
-        </p:spPr>
-        <p:txBody>
-          <a:bodyPr wrap="square">
-            <a:spAutoFit/>
-          </a:bodyPr>
-          <a:lstStyle/>
-          <a:p>
-            <a:r>
-              <a:rPr lang="en-US" sz="1800" dirty="0">
-                <a:solidFill>
-                  <a:srgbClr val="00B050"/>
-                </a:solidFill>
-              </a:rPr>
-              <a:t>V</a:t>
-            </a:r>
-            <a:endParaRPr lang="en-US" dirty="0"/>
-          </a:p>
-        </p:txBody>
-      </p:sp>
-      <p:sp>
-        <p:nvSpPr>
-          <p:cNvPr id="101" name="Arrow: Right 100">
-            <a:extLst>
-              <a:ext uri="{FF2B5EF4-FFF2-40B4-BE49-F238E27FC236}">
-                <a16:creationId xmlns:a16="http://schemas.microsoft.com/office/drawing/2014/main" id="{04912007-1CF5-63E2-C5FA-102C461AC781}"/>
-              </a:ext>
-            </a:extLst>
-          </p:cNvPr>
-          <p:cNvSpPr/>
-          <p:nvPr/>
-        </p:nvSpPr>
-        <p:spPr>
-          <a:xfrm>
-            <a:off x="10886600" y="3352536"/>
-            <a:ext cx="421461" cy="186489"/>
-          </a:xfrm>
-          <a:prstGeom prst="rightArrow">
-            <a:avLst/>
-          </a:prstGeom>
+          <a:ln>
+            <a:tailEnd type="triangle"/>
+          </a:ln>
         </p:spPr>
         <p:style>
-          <a:lnRef idx="2">
-            <a:schemeClr val="accent1">
-              <a:shade val="50000"/>
-            </a:schemeClr>
+          <a:lnRef idx="1">
+            <a:schemeClr val="dk1"/>
           </a:lnRef>
-          <a:fillRef idx="1">
-            <a:schemeClr val="accent1"/>
+          <a:fillRef idx="0">
+            <a:schemeClr val="dk1"/>
           </a:fillRef>
           <a:effectRef idx="0">
-            <a:schemeClr val="accent1"/>
+            <a:schemeClr val="dk1"/>
           </a:effectRef>
           <a:fontRef idx="minor">
-            <a:schemeClr val="lt1"/>
+            <a:schemeClr val="tx1"/>
           </a:fontRef>
         </p:style>
-        <p:txBody>
-          <a:bodyPr rtlCol="0" anchor="ctr"/>
-          <a:lstStyle/>
-          <a:p>
-            <a:pPr algn="ctr"/>
-            <a:endParaRPr lang="en-US"/>
-          </a:p>
-        </p:txBody>
-      </p:sp>
-      <p:sp>
-        <p:nvSpPr>
-          <p:cNvPr id="102" name="TextBox 101">
-            <a:extLst>
-              <a:ext uri="{FF2B5EF4-FFF2-40B4-BE49-F238E27FC236}">
-                <a16:creationId xmlns:a16="http://schemas.microsoft.com/office/drawing/2014/main" id="{CE29F0F7-E0A6-76C7-4296-D79500E32192}"/>
-              </a:ext>
-            </a:extLst>
-          </p:cNvPr>
-          <p:cNvSpPr txBox="1"/>
-          <p:nvPr/>
-        </p:nvSpPr>
-        <p:spPr>
-          <a:xfrm>
-            <a:off x="11185495" y="3059666"/>
-            <a:ext cx="945213" cy="646331"/>
-          </a:xfrm>
-          <a:prstGeom prst="rect">
-            <a:avLst/>
-          </a:prstGeom>
-          <a:noFill/>
-        </p:spPr>
-        <p:txBody>
-          <a:bodyPr wrap="square">
-            <a:spAutoFit/>
-          </a:bodyPr>
-          <a:lstStyle/>
-          <a:p>
-            <a:pPr algn="ctr"/>
-            <a:r>
-              <a:rPr lang="en-US" dirty="0"/>
-              <a:t>Misuse</a:t>
-            </a:r>
-          </a:p>
-          <a:p>
-            <a:pPr algn="ctr"/>
-            <a:r>
-              <a:rPr lang="en-US" dirty="0"/>
-              <a:t>Y/N</a:t>
-            </a:r>
-          </a:p>
-        </p:txBody>
-      </p:sp>
+      </p:cxnSp>
     </p:spTree>
     <p:extLst>
       <p:ext uri="{BB962C8B-B14F-4D97-AF65-F5344CB8AC3E}">

</xml_diff>

<commit_message>
up to tech section part A
</commit_message>
<xml_diff>
--- a/figures.pptx
+++ b/figures.pptx
@@ -200,7 +200,7 @@
           <a:p>
             <a:fld id="{318F959F-706B-42C3-AFE7-B86B79FF9195}" type="datetimeFigureOut">
               <a:rPr lang="en-US" smtClean="0"/>
-              <a:t>4/26/2023</a:t>
+              <a:t>4/27/2023</a:t>
             </a:fld>
             <a:endParaRPr lang="en-US"/>
           </a:p>
@@ -698,7 +698,7 @@
           <a:p>
             <a:fld id="{14C50D8D-A8BF-4BB2-8C54-3478D41A1FD8}" type="datetimeFigureOut">
               <a:rPr lang="en-US" smtClean="0"/>
-              <a:t>4/26/2023</a:t>
+              <a:t>4/27/2023</a:t>
             </a:fld>
             <a:endParaRPr lang="en-US"/>
           </a:p>
@@ -896,7 +896,7 @@
           <a:p>
             <a:fld id="{14C50D8D-A8BF-4BB2-8C54-3478D41A1FD8}" type="datetimeFigureOut">
               <a:rPr lang="en-US" smtClean="0"/>
-              <a:t>4/26/2023</a:t>
+              <a:t>4/27/2023</a:t>
             </a:fld>
             <a:endParaRPr lang="en-US"/>
           </a:p>
@@ -1104,7 +1104,7 @@
           <a:p>
             <a:fld id="{14C50D8D-A8BF-4BB2-8C54-3478D41A1FD8}" type="datetimeFigureOut">
               <a:rPr lang="en-US" smtClean="0"/>
-              <a:t>4/26/2023</a:t>
+              <a:t>4/27/2023</a:t>
             </a:fld>
             <a:endParaRPr lang="en-US"/>
           </a:p>
@@ -1302,7 +1302,7 @@
           <a:p>
             <a:fld id="{14C50D8D-A8BF-4BB2-8C54-3478D41A1FD8}" type="datetimeFigureOut">
               <a:rPr lang="en-US" smtClean="0"/>
-              <a:t>4/26/2023</a:t>
+              <a:t>4/27/2023</a:t>
             </a:fld>
             <a:endParaRPr lang="en-US"/>
           </a:p>
@@ -1577,7 +1577,7 @@
           <a:p>
             <a:fld id="{14C50D8D-A8BF-4BB2-8C54-3478D41A1FD8}" type="datetimeFigureOut">
               <a:rPr lang="en-US" smtClean="0"/>
-              <a:t>4/26/2023</a:t>
+              <a:t>4/27/2023</a:t>
             </a:fld>
             <a:endParaRPr lang="en-US"/>
           </a:p>
@@ -1842,7 +1842,7 @@
           <a:p>
             <a:fld id="{14C50D8D-A8BF-4BB2-8C54-3478D41A1FD8}" type="datetimeFigureOut">
               <a:rPr lang="en-US" smtClean="0"/>
-              <a:t>4/26/2023</a:t>
+              <a:t>4/27/2023</a:t>
             </a:fld>
             <a:endParaRPr lang="en-US"/>
           </a:p>
@@ -2254,7 +2254,7 @@
           <a:p>
             <a:fld id="{14C50D8D-A8BF-4BB2-8C54-3478D41A1FD8}" type="datetimeFigureOut">
               <a:rPr lang="en-US" smtClean="0"/>
-              <a:t>4/26/2023</a:t>
+              <a:t>4/27/2023</a:t>
             </a:fld>
             <a:endParaRPr lang="en-US"/>
           </a:p>
@@ -2395,7 +2395,7 @@
           <a:p>
             <a:fld id="{14C50D8D-A8BF-4BB2-8C54-3478D41A1FD8}" type="datetimeFigureOut">
               <a:rPr lang="en-US" smtClean="0"/>
-              <a:t>4/26/2023</a:t>
+              <a:t>4/27/2023</a:t>
             </a:fld>
             <a:endParaRPr lang="en-US"/>
           </a:p>
@@ -2508,7 +2508,7 @@
           <a:p>
             <a:fld id="{14C50D8D-A8BF-4BB2-8C54-3478D41A1FD8}" type="datetimeFigureOut">
               <a:rPr lang="en-US" smtClean="0"/>
-              <a:t>4/26/2023</a:t>
+              <a:t>4/27/2023</a:t>
             </a:fld>
             <a:endParaRPr lang="en-US"/>
           </a:p>
@@ -2819,7 +2819,7 @@
           <a:p>
             <a:fld id="{14C50D8D-A8BF-4BB2-8C54-3478D41A1FD8}" type="datetimeFigureOut">
               <a:rPr lang="en-US" smtClean="0"/>
-              <a:t>4/26/2023</a:t>
+              <a:t>4/27/2023</a:t>
             </a:fld>
             <a:endParaRPr lang="en-US"/>
           </a:p>
@@ -3107,7 +3107,7 @@
           <a:p>
             <a:fld id="{14C50D8D-A8BF-4BB2-8C54-3478D41A1FD8}" type="datetimeFigureOut">
               <a:rPr lang="en-US" smtClean="0"/>
-              <a:t>4/26/2023</a:t>
+              <a:t>4/27/2023</a:t>
             </a:fld>
             <a:endParaRPr lang="en-US"/>
           </a:p>
@@ -3348,7 +3348,7 @@
           <a:p>
             <a:fld id="{14C50D8D-A8BF-4BB2-8C54-3478D41A1FD8}" type="datetimeFigureOut">
               <a:rPr lang="en-US" smtClean="0"/>
-              <a:t>4/26/2023</a:t>
+              <a:t>4/27/2023</a:t>
             </a:fld>
             <a:endParaRPr lang="en-US"/>
           </a:p>
@@ -8007,8 +8007,8 @@
         </p:nvSpPr>
         <p:spPr>
           <a:xfrm>
-            <a:off x="10159986" y="2414190"/>
-            <a:ext cx="1099602" cy="369332"/>
+            <a:off x="10417967" y="1680082"/>
+            <a:ext cx="1099602" cy="1200329"/>
           </a:xfrm>
           <a:prstGeom prst="rect">
             <a:avLst/>
@@ -8024,7 +8024,14 @@
             <a:pPr algn="ctr"/>
             <a:r>
               <a:rPr lang="en-US" dirty="0"/>
-              <a:t>Classifier </a:t>
+              <a:t>Classifier</a:t>
+            </a:r>
+          </a:p>
+          <a:p>
+            <a:pPr algn="ctr"/>
+            <a:r>
+              <a:rPr lang="en-US" dirty="0"/>
+              <a:t>For API misuse detection </a:t>
             </a:r>
           </a:p>
         </p:txBody>
@@ -8043,8 +8050,8 @@
         </p:nvSpPr>
         <p:spPr>
           <a:xfrm>
-            <a:off x="10439613" y="3096068"/>
-            <a:ext cx="362257" cy="369332"/>
+            <a:off x="10458010" y="3476072"/>
+            <a:ext cx="362257" cy="461665"/>
           </a:xfrm>
           <a:prstGeom prst="rect">
             <a:avLst/>
@@ -8058,18 +8065,13 @@
           <a:lstStyle/>
           <a:p>
             <a:r>
-              <a:rPr lang="en-US" sz="1800" dirty="0">
+              <a:rPr lang="en-US" sz="2400" dirty="0">
                 <a:solidFill>
                   <a:srgbClr val="7030A0"/>
                 </a:solidFill>
               </a:rPr>
               <a:t>V</a:t>
             </a:r>
-            <a:endParaRPr lang="en-US" dirty="0">
-              <a:solidFill>
-                <a:srgbClr val="7030A0"/>
-              </a:solidFill>
-            </a:endParaRPr>
           </a:p>
         </p:txBody>
       </p:sp>
@@ -9251,6 +9253,84 @@
           </a:fillRef>
           <a:effectRef idx="0">
             <a:schemeClr val="dk1"/>
+          </a:effectRef>
+          <a:fontRef idx="minor">
+            <a:schemeClr val="tx1"/>
+          </a:fontRef>
+        </p:style>
+      </p:cxnSp>
+      <p:sp>
+        <p:nvSpPr>
+          <p:cNvPr id="44" name="TextBox 43">
+            <a:extLst>
+              <a:ext uri="{FF2B5EF4-FFF2-40B4-BE49-F238E27FC236}">
+                <a16:creationId xmlns:a16="http://schemas.microsoft.com/office/drawing/2014/main" id="{4189D4C7-51C6-17F2-EBA3-2ABCC165E403}"/>
+              </a:ext>
+            </a:extLst>
+          </p:cNvPr>
+          <p:cNvSpPr txBox="1"/>
+          <p:nvPr/>
+        </p:nvSpPr>
+        <p:spPr>
+          <a:xfrm>
+            <a:off x="9991901" y="4184132"/>
+            <a:ext cx="1294477" cy="923330"/>
+          </a:xfrm>
+          <a:prstGeom prst="rect">
+            <a:avLst/>
+          </a:prstGeom>
+          <a:noFill/>
+        </p:spPr>
+        <p:txBody>
+          <a:bodyPr wrap="square">
+            <a:spAutoFit/>
+          </a:bodyPr>
+          <a:lstStyle/>
+          <a:p>
+            <a:pPr algn="ctr"/>
+            <a:r>
+              <a:rPr lang="en-US" dirty="0"/>
+              <a:t>Embedding for API usage</a:t>
+            </a:r>
+          </a:p>
+        </p:txBody>
+      </p:sp>
+      <p:cxnSp>
+        <p:nvCxnSpPr>
+          <p:cNvPr id="46" name="Straight Arrow Connector 45">
+            <a:extLst>
+              <a:ext uri="{FF2B5EF4-FFF2-40B4-BE49-F238E27FC236}">
+                <a16:creationId xmlns:a16="http://schemas.microsoft.com/office/drawing/2014/main" id="{C7BA1C24-626B-48AE-DCAC-C2185100E7F2}"/>
+              </a:ext>
+            </a:extLst>
+          </p:cNvPr>
+          <p:cNvCxnSpPr>
+            <a:stCxn id="44" idx="0"/>
+            <a:endCxn id="100" idx="2"/>
+          </p:cNvCxnSpPr>
+          <p:nvPr/>
+        </p:nvCxnSpPr>
+        <p:spPr>
+          <a:xfrm flipH="1" flipV="1">
+            <a:off x="10639139" y="3937737"/>
+            <a:ext cx="1" cy="246395"/>
+          </a:xfrm>
+          <a:prstGeom prst="straightConnector1">
+            <a:avLst/>
+          </a:prstGeom>
+          <a:ln>
+            <a:tailEnd type="triangle"/>
+          </a:ln>
+        </p:spPr>
+        <p:style>
+          <a:lnRef idx="1">
+            <a:schemeClr val="accent1"/>
+          </a:lnRef>
+          <a:fillRef idx="0">
+            <a:schemeClr val="accent1"/>
+          </a:fillRef>
+          <a:effectRef idx="0">
+            <a:schemeClr val="accent1"/>
           </a:effectRef>
           <a:fontRef idx="minor">
             <a:schemeClr val="tx1"/>

</xml_diff>